<commit_message>
W2 - removal of limits from geom_histogram because of buggy warning with updates to doc/pdf example; W3 framework and data added
</commit_message>
<xml_diff>
--- a/slides/02-logic-data-types-importing.pptx
+++ b/slides/02-logic-data-types-importing.pptx
@@ -9341,6 +9341,13 @@
   <p:clrMapOvr>
     <a:masterClrMapping/>
   </p:clrMapOvr>
+  <p:timing>
+    <p:tnLst>
+      <p:par>
+        <p:cTn id="1" dur="indefinite" restart="never" nodeType="tmRoot"/>
+      </p:par>
+    </p:tnLst>
+  </p:timing>
 </p:sld>
 </file>
 
@@ -9949,6 +9956,13 @@
   <p:clrMapOvr>
     <a:masterClrMapping/>
   </p:clrMapOvr>
+  <p:timing>
+    <p:tnLst>
+      <p:par>
+        <p:cTn id="1" dur="indefinite" restart="never" nodeType="tmRoot"/>
+      </p:par>
+    </p:tnLst>
+  </p:timing>
 </p:sld>
 </file>
 
@@ -10371,6 +10385,13 @@
   <p:clrMapOvr>
     <a:masterClrMapping/>
   </p:clrMapOvr>
+  <p:timing>
+    <p:tnLst>
+      <p:par>
+        <p:cTn id="1" dur="indefinite" restart="never" nodeType="tmRoot"/>
+      </p:par>
+    </p:tnLst>
+  </p:timing>
 </p:sld>
 </file>
 
@@ -10645,6 +10666,13 @@
   <p:clrMapOvr>
     <a:masterClrMapping/>
   </p:clrMapOvr>
+  <p:timing>
+    <p:tnLst>
+      <p:par>
+        <p:cTn id="1" dur="indefinite" restart="never" nodeType="tmRoot"/>
+      </p:par>
+    </p:tnLst>
+  </p:timing>
 </p:sld>
 </file>
 
@@ -10687,7 +10715,11 @@
           <a:p>
             <a:r>
               <a:rPr lang="en-GB" altLang="en-US" dirty="0"/>
-              <a:t>Hypothesis Testing – relationship to L1 example</a:t>
+              <a:t>Hypothesis Testing </a:t>
+            </a:r>
+            <a:r>
+              <a:rPr lang="en-GB" altLang="en-US" dirty="0" smtClean="0"/>
+              <a:t>example</a:t>
             </a:r>
             <a:endParaRPr lang="en-GB" altLang="en-US" dirty="0" smtClean="0"/>
           </a:p>

</xml_diff>